<commit_message>
Updated PPT for multicamera
-More snapshots added and updated steps
</commit_message>
<xml_diff>
--- a/ParseLog_Plot_Graph.pptx
+++ b/ParseLog_Plot_Graph.pptx
@@ -5,31 +5,38 @@
     <p:sldMasterId id="2147483648" r:id="rId1"/>
   </p:sldMasterIdLst>
   <p:notesMasterIdLst>
-    <p:notesMasterId r:id="rId16"/>
+    <p:notesMasterId r:id="rId23"/>
   </p:notesMasterIdLst>
   <p:handoutMasterIdLst>
-    <p:handoutMasterId r:id="rId17"/>
+    <p:handoutMasterId r:id="rId24"/>
   </p:handoutMasterIdLst>
   <p:sldIdLst>
     <p:sldId id="573" r:id="rId2"/>
     <p:sldId id="898" r:id="rId3"/>
     <p:sldId id="955" r:id="rId4"/>
     <p:sldId id="899" r:id="rId5"/>
-    <p:sldId id="947" r:id="rId6"/>
-    <p:sldId id="948" r:id="rId7"/>
-    <p:sldId id="949" r:id="rId8"/>
-    <p:sldId id="954" r:id="rId9"/>
-    <p:sldId id="950" r:id="rId10"/>
-    <p:sldId id="956" r:id="rId11"/>
-    <p:sldId id="951" r:id="rId12"/>
-    <p:sldId id="953" r:id="rId13"/>
-    <p:sldId id="952" r:id="rId14"/>
-    <p:sldId id="884" r:id="rId15"/>
+    <p:sldId id="957" r:id="rId6"/>
+    <p:sldId id="947" r:id="rId7"/>
+    <p:sldId id="948" r:id="rId8"/>
+    <p:sldId id="949" r:id="rId9"/>
+    <p:sldId id="954" r:id="rId10"/>
+    <p:sldId id="950" r:id="rId11"/>
+    <p:sldId id="956" r:id="rId12"/>
+    <p:sldId id="951" r:id="rId13"/>
+    <p:sldId id="958" r:id="rId14"/>
+    <p:sldId id="959" r:id="rId15"/>
+    <p:sldId id="960" r:id="rId16"/>
+    <p:sldId id="953" r:id="rId17"/>
+    <p:sldId id="952" r:id="rId18"/>
+    <p:sldId id="961" r:id="rId19"/>
+    <p:sldId id="962" r:id="rId20"/>
+    <p:sldId id="963" r:id="rId21"/>
+    <p:sldId id="884" r:id="rId22"/>
   </p:sldIdLst>
   <p:sldSz cx="12192000" cy="6858000"/>
   <p:notesSz cx="6858000" cy="9144000"/>
   <p:custDataLst>
-    <p:tags r:id="rId18"/>
+    <p:tags r:id="rId25"/>
   </p:custDataLst>
   <p:defaultTextStyle>
     <a:defPPr>
@@ -139,6 +146,7 @@
             <p14:sldId id="898"/>
             <p14:sldId id="955"/>
             <p14:sldId id="899"/>
+            <p14:sldId id="957"/>
             <p14:sldId id="947"/>
             <p14:sldId id="948"/>
             <p14:sldId id="949"/>
@@ -146,8 +154,14 @@
             <p14:sldId id="950"/>
             <p14:sldId id="956"/>
             <p14:sldId id="951"/>
+            <p14:sldId id="958"/>
+            <p14:sldId id="959"/>
+            <p14:sldId id="960"/>
             <p14:sldId id="953"/>
             <p14:sldId id="952"/>
+            <p14:sldId id="961"/>
+            <p14:sldId id="962"/>
+            <p14:sldId id="963"/>
           </p14:sldIdLst>
         </p14:section>
         <p14:section name="Slide Types" id="{DBF0F1FC-5A7F-4CF0-8306-5887B4B82216}">
@@ -2896,7 +2910,7 @@
     </p:spTree>
     <p:extLst>
       <p:ext uri="{BB962C8B-B14F-4D97-AF65-F5344CB8AC3E}">
-        <p14:creationId xmlns:p14="http://schemas.microsoft.com/office/powerpoint/2010/main" val="2355136759"/>
+        <p14:creationId xmlns:p14="http://schemas.microsoft.com/office/powerpoint/2010/main" val="1076195960"/>
       </p:ext>
     </p:extLst>
   </p:cSld>
@@ -2995,7 +3009,7 @@
     </p:spTree>
     <p:extLst>
       <p:ext uri="{BB962C8B-B14F-4D97-AF65-F5344CB8AC3E}">
-        <p14:creationId xmlns:p14="http://schemas.microsoft.com/office/powerpoint/2010/main" val="2443754286"/>
+        <p14:creationId xmlns:p14="http://schemas.microsoft.com/office/powerpoint/2010/main" val="2355136759"/>
       </p:ext>
     </p:extLst>
   </p:cSld>
@@ -3094,7 +3108,7 @@
     </p:spTree>
     <p:extLst>
       <p:ext uri="{BB962C8B-B14F-4D97-AF65-F5344CB8AC3E}">
-        <p14:creationId xmlns:p14="http://schemas.microsoft.com/office/powerpoint/2010/main" val="1679626854"/>
+        <p14:creationId xmlns:p14="http://schemas.microsoft.com/office/powerpoint/2010/main" val="2443754286"/>
       </p:ext>
     </p:extLst>
   </p:cSld>
@@ -3193,7 +3207,601 @@
     </p:spTree>
     <p:extLst>
       <p:ext uri="{BB962C8B-B14F-4D97-AF65-F5344CB8AC3E}">
+        <p14:creationId xmlns:p14="http://schemas.microsoft.com/office/powerpoint/2010/main" val="1408651838"/>
+      </p:ext>
+    </p:extLst>
+  </p:cSld>
+  <p:clrMapOvr>
+    <a:masterClrMapping/>
+  </p:clrMapOvr>
+</p:notes>
+</file>
+
+<file path=ppt/notesSlides/notesSlide14.xml><?xml version="1.0" encoding="utf-8"?>
+<p:notes xmlns:a="http://schemas.openxmlformats.org/drawingml/2006/main" xmlns:r="http://schemas.openxmlformats.org/officeDocument/2006/relationships" xmlns:p="http://schemas.openxmlformats.org/presentationml/2006/main">
+  <p:cSld>
+    <p:spTree>
+      <p:nvGrpSpPr>
+        <p:cNvPr id="1" name=""/>
+        <p:cNvGrpSpPr/>
+        <p:nvPr/>
+      </p:nvGrpSpPr>
+      <p:grpSpPr>
+        <a:xfrm>
+          <a:off x="0" y="0"/>
+          <a:ext cx="0" cy="0"/>
+          <a:chOff x="0" y="0"/>
+          <a:chExt cx="0" cy="0"/>
+        </a:xfrm>
+      </p:grpSpPr>
+      <p:sp>
+        <p:nvSpPr>
+          <p:cNvPr id="2" name="Slide Image Placeholder 1"/>
+          <p:cNvSpPr>
+            <a:spLocks noGrp="1" noRot="1" noChangeAspect="1"/>
+          </p:cNvSpPr>
+          <p:nvPr>
+            <p:ph type="sldImg"/>
+          </p:nvPr>
+        </p:nvSpPr>
+        <p:spPr>
+          <a:xfrm>
+            <a:off x="946150" y="555625"/>
+            <a:ext cx="4964113" cy="2792413"/>
+          </a:xfrm>
+        </p:spPr>
+      </p:sp>
+      <p:sp>
+        <p:nvSpPr>
+          <p:cNvPr id="3" name="Notes Placeholder 2"/>
+          <p:cNvSpPr>
+            <a:spLocks noGrp="1"/>
+          </p:cNvSpPr>
+          <p:nvPr>
+            <p:ph type="body" idx="1"/>
+          </p:nvPr>
+        </p:nvSpPr>
+        <p:spPr/>
+        <p:txBody>
+          <a:bodyPr/>
+          <a:lstStyle/>
+          <a:p>
+            <a:endParaRPr lang="en-US"/>
+          </a:p>
+        </p:txBody>
+      </p:sp>
+      <p:sp>
+        <p:nvSpPr>
+          <p:cNvPr id="4" name="Slide Number Placeholder 3"/>
+          <p:cNvSpPr>
+            <a:spLocks noGrp="1"/>
+          </p:cNvSpPr>
+          <p:nvPr>
+            <p:ph type="sldNum" sz="quarter" idx="10"/>
+          </p:nvPr>
+        </p:nvSpPr>
+        <p:spPr/>
+        <p:txBody>
+          <a:bodyPr/>
+          <a:lstStyle/>
+          <a:p>
+            <a:pPr>
+              <a:lnSpc>
+                <a:spcPct val="93000"/>
+              </a:lnSpc>
+            </a:pPr>
+            <a:fld id="{785BB0B3-964C-4CDE-9D3D-0BF955B8C425}" type="slidenum">
+              <a:rPr lang="en-US" smtClean="0"/>
+              <a:pPr>
+                <a:lnSpc>
+                  <a:spcPct val="93000"/>
+                </a:lnSpc>
+              </a:pPr>
+              <a:t>14</a:t>
+            </a:fld>
+            <a:endParaRPr lang="en-US" dirty="0"/>
+          </a:p>
+        </p:txBody>
+      </p:sp>
+    </p:spTree>
+    <p:extLst>
+      <p:ext uri="{BB962C8B-B14F-4D97-AF65-F5344CB8AC3E}">
+        <p14:creationId xmlns:p14="http://schemas.microsoft.com/office/powerpoint/2010/main" val="845189607"/>
+      </p:ext>
+    </p:extLst>
+  </p:cSld>
+  <p:clrMapOvr>
+    <a:masterClrMapping/>
+  </p:clrMapOvr>
+</p:notes>
+</file>
+
+<file path=ppt/notesSlides/notesSlide15.xml><?xml version="1.0" encoding="utf-8"?>
+<p:notes xmlns:a="http://schemas.openxmlformats.org/drawingml/2006/main" xmlns:r="http://schemas.openxmlformats.org/officeDocument/2006/relationships" xmlns:p="http://schemas.openxmlformats.org/presentationml/2006/main">
+  <p:cSld>
+    <p:spTree>
+      <p:nvGrpSpPr>
+        <p:cNvPr id="1" name=""/>
+        <p:cNvGrpSpPr/>
+        <p:nvPr/>
+      </p:nvGrpSpPr>
+      <p:grpSpPr>
+        <a:xfrm>
+          <a:off x="0" y="0"/>
+          <a:ext cx="0" cy="0"/>
+          <a:chOff x="0" y="0"/>
+          <a:chExt cx="0" cy="0"/>
+        </a:xfrm>
+      </p:grpSpPr>
+      <p:sp>
+        <p:nvSpPr>
+          <p:cNvPr id="2" name="Slide Image Placeholder 1"/>
+          <p:cNvSpPr>
+            <a:spLocks noGrp="1" noRot="1" noChangeAspect="1"/>
+          </p:cNvSpPr>
+          <p:nvPr>
+            <p:ph type="sldImg"/>
+          </p:nvPr>
+        </p:nvSpPr>
+        <p:spPr>
+          <a:xfrm>
+            <a:off x="946150" y="555625"/>
+            <a:ext cx="4964113" cy="2792413"/>
+          </a:xfrm>
+        </p:spPr>
+      </p:sp>
+      <p:sp>
+        <p:nvSpPr>
+          <p:cNvPr id="3" name="Notes Placeholder 2"/>
+          <p:cNvSpPr>
+            <a:spLocks noGrp="1"/>
+          </p:cNvSpPr>
+          <p:nvPr>
+            <p:ph type="body" idx="1"/>
+          </p:nvPr>
+        </p:nvSpPr>
+        <p:spPr/>
+        <p:txBody>
+          <a:bodyPr/>
+          <a:lstStyle/>
+          <a:p>
+            <a:endParaRPr lang="en-US"/>
+          </a:p>
+        </p:txBody>
+      </p:sp>
+      <p:sp>
+        <p:nvSpPr>
+          <p:cNvPr id="4" name="Slide Number Placeholder 3"/>
+          <p:cNvSpPr>
+            <a:spLocks noGrp="1"/>
+          </p:cNvSpPr>
+          <p:nvPr>
+            <p:ph type="sldNum" sz="quarter" idx="10"/>
+          </p:nvPr>
+        </p:nvSpPr>
+        <p:spPr/>
+        <p:txBody>
+          <a:bodyPr/>
+          <a:lstStyle/>
+          <a:p>
+            <a:pPr>
+              <a:lnSpc>
+                <a:spcPct val="93000"/>
+              </a:lnSpc>
+            </a:pPr>
+            <a:fld id="{785BB0B3-964C-4CDE-9D3D-0BF955B8C425}" type="slidenum">
+              <a:rPr lang="en-US" smtClean="0"/>
+              <a:pPr>
+                <a:lnSpc>
+                  <a:spcPct val="93000"/>
+                </a:lnSpc>
+              </a:pPr>
+              <a:t>15</a:t>
+            </a:fld>
+            <a:endParaRPr lang="en-US" dirty="0"/>
+          </a:p>
+        </p:txBody>
+      </p:sp>
+    </p:spTree>
+    <p:extLst>
+      <p:ext uri="{BB962C8B-B14F-4D97-AF65-F5344CB8AC3E}">
+        <p14:creationId xmlns:p14="http://schemas.microsoft.com/office/powerpoint/2010/main" val="1151586582"/>
+      </p:ext>
+    </p:extLst>
+  </p:cSld>
+  <p:clrMapOvr>
+    <a:masterClrMapping/>
+  </p:clrMapOvr>
+</p:notes>
+</file>
+
+<file path=ppt/notesSlides/notesSlide16.xml><?xml version="1.0" encoding="utf-8"?>
+<p:notes xmlns:a="http://schemas.openxmlformats.org/drawingml/2006/main" xmlns:r="http://schemas.openxmlformats.org/officeDocument/2006/relationships" xmlns:p="http://schemas.openxmlformats.org/presentationml/2006/main">
+  <p:cSld>
+    <p:spTree>
+      <p:nvGrpSpPr>
+        <p:cNvPr id="1" name=""/>
+        <p:cNvGrpSpPr/>
+        <p:nvPr/>
+      </p:nvGrpSpPr>
+      <p:grpSpPr>
+        <a:xfrm>
+          <a:off x="0" y="0"/>
+          <a:ext cx="0" cy="0"/>
+          <a:chOff x="0" y="0"/>
+          <a:chExt cx="0" cy="0"/>
+        </a:xfrm>
+      </p:grpSpPr>
+      <p:sp>
+        <p:nvSpPr>
+          <p:cNvPr id="2" name="Slide Image Placeholder 1"/>
+          <p:cNvSpPr>
+            <a:spLocks noGrp="1" noRot="1" noChangeAspect="1"/>
+          </p:cNvSpPr>
+          <p:nvPr>
+            <p:ph type="sldImg"/>
+          </p:nvPr>
+        </p:nvSpPr>
+        <p:spPr>
+          <a:xfrm>
+            <a:off x="946150" y="555625"/>
+            <a:ext cx="4964113" cy="2792413"/>
+          </a:xfrm>
+        </p:spPr>
+      </p:sp>
+      <p:sp>
+        <p:nvSpPr>
+          <p:cNvPr id="3" name="Notes Placeholder 2"/>
+          <p:cNvSpPr>
+            <a:spLocks noGrp="1"/>
+          </p:cNvSpPr>
+          <p:nvPr>
+            <p:ph type="body" idx="1"/>
+          </p:nvPr>
+        </p:nvSpPr>
+        <p:spPr/>
+        <p:txBody>
+          <a:bodyPr/>
+          <a:lstStyle/>
+          <a:p>
+            <a:endParaRPr lang="en-US"/>
+          </a:p>
+        </p:txBody>
+      </p:sp>
+      <p:sp>
+        <p:nvSpPr>
+          <p:cNvPr id="4" name="Slide Number Placeholder 3"/>
+          <p:cNvSpPr>
+            <a:spLocks noGrp="1"/>
+          </p:cNvSpPr>
+          <p:nvPr>
+            <p:ph type="sldNum" sz="quarter" idx="10"/>
+          </p:nvPr>
+        </p:nvSpPr>
+        <p:spPr/>
+        <p:txBody>
+          <a:bodyPr/>
+          <a:lstStyle/>
+          <a:p>
+            <a:pPr>
+              <a:lnSpc>
+                <a:spcPct val="93000"/>
+              </a:lnSpc>
+            </a:pPr>
+            <a:fld id="{785BB0B3-964C-4CDE-9D3D-0BF955B8C425}" type="slidenum">
+              <a:rPr lang="en-US" smtClean="0"/>
+              <a:pPr>
+                <a:lnSpc>
+                  <a:spcPct val="93000"/>
+                </a:lnSpc>
+              </a:pPr>
+              <a:t>16</a:t>
+            </a:fld>
+            <a:endParaRPr lang="en-US" dirty="0"/>
+          </a:p>
+        </p:txBody>
+      </p:sp>
+    </p:spTree>
+    <p:extLst>
+      <p:ext uri="{BB962C8B-B14F-4D97-AF65-F5344CB8AC3E}">
+        <p14:creationId xmlns:p14="http://schemas.microsoft.com/office/powerpoint/2010/main" val="1679626854"/>
+      </p:ext>
+    </p:extLst>
+  </p:cSld>
+  <p:clrMapOvr>
+    <a:masterClrMapping/>
+  </p:clrMapOvr>
+</p:notes>
+</file>
+
+<file path=ppt/notesSlides/notesSlide17.xml><?xml version="1.0" encoding="utf-8"?>
+<p:notes xmlns:a="http://schemas.openxmlformats.org/drawingml/2006/main" xmlns:r="http://schemas.openxmlformats.org/officeDocument/2006/relationships" xmlns:p="http://schemas.openxmlformats.org/presentationml/2006/main">
+  <p:cSld>
+    <p:spTree>
+      <p:nvGrpSpPr>
+        <p:cNvPr id="1" name=""/>
+        <p:cNvGrpSpPr/>
+        <p:nvPr/>
+      </p:nvGrpSpPr>
+      <p:grpSpPr>
+        <a:xfrm>
+          <a:off x="0" y="0"/>
+          <a:ext cx="0" cy="0"/>
+          <a:chOff x="0" y="0"/>
+          <a:chExt cx="0" cy="0"/>
+        </a:xfrm>
+      </p:grpSpPr>
+      <p:sp>
+        <p:nvSpPr>
+          <p:cNvPr id="2" name="Slide Image Placeholder 1"/>
+          <p:cNvSpPr>
+            <a:spLocks noGrp="1" noRot="1" noChangeAspect="1"/>
+          </p:cNvSpPr>
+          <p:nvPr>
+            <p:ph type="sldImg"/>
+          </p:nvPr>
+        </p:nvSpPr>
+        <p:spPr>
+          <a:xfrm>
+            <a:off x="946150" y="555625"/>
+            <a:ext cx="4964113" cy="2792413"/>
+          </a:xfrm>
+        </p:spPr>
+      </p:sp>
+      <p:sp>
+        <p:nvSpPr>
+          <p:cNvPr id="3" name="Notes Placeholder 2"/>
+          <p:cNvSpPr>
+            <a:spLocks noGrp="1"/>
+          </p:cNvSpPr>
+          <p:nvPr>
+            <p:ph type="body" idx="1"/>
+          </p:nvPr>
+        </p:nvSpPr>
+        <p:spPr/>
+        <p:txBody>
+          <a:bodyPr/>
+          <a:lstStyle/>
+          <a:p>
+            <a:endParaRPr lang="en-US"/>
+          </a:p>
+        </p:txBody>
+      </p:sp>
+      <p:sp>
+        <p:nvSpPr>
+          <p:cNvPr id="4" name="Slide Number Placeholder 3"/>
+          <p:cNvSpPr>
+            <a:spLocks noGrp="1"/>
+          </p:cNvSpPr>
+          <p:nvPr>
+            <p:ph type="sldNum" sz="quarter" idx="10"/>
+          </p:nvPr>
+        </p:nvSpPr>
+        <p:spPr/>
+        <p:txBody>
+          <a:bodyPr/>
+          <a:lstStyle/>
+          <a:p>
+            <a:pPr>
+              <a:lnSpc>
+                <a:spcPct val="93000"/>
+              </a:lnSpc>
+            </a:pPr>
+            <a:fld id="{785BB0B3-964C-4CDE-9D3D-0BF955B8C425}" type="slidenum">
+              <a:rPr lang="en-US" smtClean="0"/>
+              <a:pPr>
+                <a:lnSpc>
+                  <a:spcPct val="93000"/>
+                </a:lnSpc>
+              </a:pPr>
+              <a:t>17</a:t>
+            </a:fld>
+            <a:endParaRPr lang="en-US" dirty="0"/>
+          </a:p>
+        </p:txBody>
+      </p:sp>
+    </p:spTree>
+    <p:extLst>
+      <p:ext uri="{BB962C8B-B14F-4D97-AF65-F5344CB8AC3E}">
         <p14:creationId xmlns:p14="http://schemas.microsoft.com/office/powerpoint/2010/main" val="3476335474"/>
+      </p:ext>
+    </p:extLst>
+  </p:cSld>
+  <p:clrMapOvr>
+    <a:masterClrMapping/>
+  </p:clrMapOvr>
+</p:notes>
+</file>
+
+<file path=ppt/notesSlides/notesSlide18.xml><?xml version="1.0" encoding="utf-8"?>
+<p:notes xmlns:a="http://schemas.openxmlformats.org/drawingml/2006/main" xmlns:r="http://schemas.openxmlformats.org/officeDocument/2006/relationships" xmlns:p="http://schemas.openxmlformats.org/presentationml/2006/main">
+  <p:cSld>
+    <p:spTree>
+      <p:nvGrpSpPr>
+        <p:cNvPr id="1" name=""/>
+        <p:cNvGrpSpPr/>
+        <p:nvPr/>
+      </p:nvGrpSpPr>
+      <p:grpSpPr>
+        <a:xfrm>
+          <a:off x="0" y="0"/>
+          <a:ext cx="0" cy="0"/>
+          <a:chOff x="0" y="0"/>
+          <a:chExt cx="0" cy="0"/>
+        </a:xfrm>
+      </p:grpSpPr>
+      <p:sp>
+        <p:nvSpPr>
+          <p:cNvPr id="2" name="Slide Image Placeholder 1"/>
+          <p:cNvSpPr>
+            <a:spLocks noGrp="1" noRot="1" noChangeAspect="1"/>
+          </p:cNvSpPr>
+          <p:nvPr>
+            <p:ph type="sldImg"/>
+          </p:nvPr>
+        </p:nvSpPr>
+        <p:spPr>
+          <a:xfrm>
+            <a:off x="946150" y="555625"/>
+            <a:ext cx="4964113" cy="2792413"/>
+          </a:xfrm>
+        </p:spPr>
+      </p:sp>
+      <p:sp>
+        <p:nvSpPr>
+          <p:cNvPr id="3" name="Notes Placeholder 2"/>
+          <p:cNvSpPr>
+            <a:spLocks noGrp="1"/>
+          </p:cNvSpPr>
+          <p:nvPr>
+            <p:ph type="body" idx="1"/>
+          </p:nvPr>
+        </p:nvSpPr>
+        <p:spPr/>
+        <p:txBody>
+          <a:bodyPr/>
+          <a:lstStyle/>
+          <a:p>
+            <a:endParaRPr lang="en-US"/>
+          </a:p>
+        </p:txBody>
+      </p:sp>
+      <p:sp>
+        <p:nvSpPr>
+          <p:cNvPr id="4" name="Slide Number Placeholder 3"/>
+          <p:cNvSpPr>
+            <a:spLocks noGrp="1"/>
+          </p:cNvSpPr>
+          <p:nvPr>
+            <p:ph type="sldNum" sz="quarter" idx="10"/>
+          </p:nvPr>
+        </p:nvSpPr>
+        <p:spPr/>
+        <p:txBody>
+          <a:bodyPr/>
+          <a:lstStyle/>
+          <a:p>
+            <a:pPr>
+              <a:lnSpc>
+                <a:spcPct val="93000"/>
+              </a:lnSpc>
+            </a:pPr>
+            <a:fld id="{785BB0B3-964C-4CDE-9D3D-0BF955B8C425}" type="slidenum">
+              <a:rPr lang="en-US" smtClean="0"/>
+              <a:pPr>
+                <a:lnSpc>
+                  <a:spcPct val="93000"/>
+                </a:lnSpc>
+              </a:pPr>
+              <a:t>18</a:t>
+            </a:fld>
+            <a:endParaRPr lang="en-US" dirty="0"/>
+          </a:p>
+        </p:txBody>
+      </p:sp>
+    </p:spTree>
+    <p:extLst>
+      <p:ext uri="{BB962C8B-B14F-4D97-AF65-F5344CB8AC3E}">
+        <p14:creationId xmlns:p14="http://schemas.microsoft.com/office/powerpoint/2010/main" val="110519190"/>
+      </p:ext>
+    </p:extLst>
+  </p:cSld>
+  <p:clrMapOvr>
+    <a:masterClrMapping/>
+  </p:clrMapOvr>
+</p:notes>
+</file>
+
+<file path=ppt/notesSlides/notesSlide19.xml><?xml version="1.0" encoding="utf-8"?>
+<p:notes xmlns:a="http://schemas.openxmlformats.org/drawingml/2006/main" xmlns:r="http://schemas.openxmlformats.org/officeDocument/2006/relationships" xmlns:p="http://schemas.openxmlformats.org/presentationml/2006/main">
+  <p:cSld>
+    <p:spTree>
+      <p:nvGrpSpPr>
+        <p:cNvPr id="1" name=""/>
+        <p:cNvGrpSpPr/>
+        <p:nvPr/>
+      </p:nvGrpSpPr>
+      <p:grpSpPr>
+        <a:xfrm>
+          <a:off x="0" y="0"/>
+          <a:ext cx="0" cy="0"/>
+          <a:chOff x="0" y="0"/>
+          <a:chExt cx="0" cy="0"/>
+        </a:xfrm>
+      </p:grpSpPr>
+      <p:sp>
+        <p:nvSpPr>
+          <p:cNvPr id="2" name="Slide Image Placeholder 1"/>
+          <p:cNvSpPr>
+            <a:spLocks noGrp="1" noRot="1" noChangeAspect="1"/>
+          </p:cNvSpPr>
+          <p:nvPr>
+            <p:ph type="sldImg"/>
+          </p:nvPr>
+        </p:nvSpPr>
+        <p:spPr>
+          <a:xfrm>
+            <a:off x="946150" y="555625"/>
+            <a:ext cx="4964113" cy="2792413"/>
+          </a:xfrm>
+        </p:spPr>
+      </p:sp>
+      <p:sp>
+        <p:nvSpPr>
+          <p:cNvPr id="3" name="Notes Placeholder 2"/>
+          <p:cNvSpPr>
+            <a:spLocks noGrp="1"/>
+          </p:cNvSpPr>
+          <p:nvPr>
+            <p:ph type="body" idx="1"/>
+          </p:nvPr>
+        </p:nvSpPr>
+        <p:spPr/>
+        <p:txBody>
+          <a:bodyPr/>
+          <a:lstStyle/>
+          <a:p>
+            <a:endParaRPr lang="en-US"/>
+          </a:p>
+        </p:txBody>
+      </p:sp>
+      <p:sp>
+        <p:nvSpPr>
+          <p:cNvPr id="4" name="Slide Number Placeholder 3"/>
+          <p:cNvSpPr>
+            <a:spLocks noGrp="1"/>
+          </p:cNvSpPr>
+          <p:nvPr>
+            <p:ph type="sldNum" sz="quarter" idx="10"/>
+          </p:nvPr>
+        </p:nvSpPr>
+        <p:spPr/>
+        <p:txBody>
+          <a:bodyPr/>
+          <a:lstStyle/>
+          <a:p>
+            <a:pPr>
+              <a:lnSpc>
+                <a:spcPct val="93000"/>
+              </a:lnSpc>
+            </a:pPr>
+            <a:fld id="{785BB0B3-964C-4CDE-9D3D-0BF955B8C425}" type="slidenum">
+              <a:rPr lang="en-US" smtClean="0"/>
+              <a:pPr>
+                <a:lnSpc>
+                  <a:spcPct val="93000"/>
+                </a:lnSpc>
+              </a:pPr>
+              <a:t>19</a:t>
+            </a:fld>
+            <a:endParaRPr lang="en-US" dirty="0"/>
+          </a:p>
+        </p:txBody>
+      </p:sp>
+    </p:spTree>
+    <p:extLst>
+      <p:ext uri="{BB962C8B-B14F-4D97-AF65-F5344CB8AC3E}">
+        <p14:creationId xmlns:p14="http://schemas.microsoft.com/office/powerpoint/2010/main" val="4070585375"/>
       </p:ext>
     </p:extLst>
   </p:cSld>
@@ -3293,6 +3901,105 @@
     <p:extLst>
       <p:ext uri="{BB962C8B-B14F-4D97-AF65-F5344CB8AC3E}">
         <p14:creationId xmlns:p14="http://schemas.microsoft.com/office/powerpoint/2010/main" val="4203886682"/>
+      </p:ext>
+    </p:extLst>
+  </p:cSld>
+  <p:clrMapOvr>
+    <a:masterClrMapping/>
+  </p:clrMapOvr>
+</p:notes>
+</file>
+
+<file path=ppt/notesSlides/notesSlide20.xml><?xml version="1.0" encoding="utf-8"?>
+<p:notes xmlns:a="http://schemas.openxmlformats.org/drawingml/2006/main" xmlns:r="http://schemas.openxmlformats.org/officeDocument/2006/relationships" xmlns:p="http://schemas.openxmlformats.org/presentationml/2006/main">
+  <p:cSld>
+    <p:spTree>
+      <p:nvGrpSpPr>
+        <p:cNvPr id="1" name=""/>
+        <p:cNvGrpSpPr/>
+        <p:nvPr/>
+      </p:nvGrpSpPr>
+      <p:grpSpPr>
+        <a:xfrm>
+          <a:off x="0" y="0"/>
+          <a:ext cx="0" cy="0"/>
+          <a:chOff x="0" y="0"/>
+          <a:chExt cx="0" cy="0"/>
+        </a:xfrm>
+      </p:grpSpPr>
+      <p:sp>
+        <p:nvSpPr>
+          <p:cNvPr id="2" name="Slide Image Placeholder 1"/>
+          <p:cNvSpPr>
+            <a:spLocks noGrp="1" noRot="1" noChangeAspect="1"/>
+          </p:cNvSpPr>
+          <p:nvPr>
+            <p:ph type="sldImg"/>
+          </p:nvPr>
+        </p:nvSpPr>
+        <p:spPr>
+          <a:xfrm>
+            <a:off x="946150" y="555625"/>
+            <a:ext cx="4964113" cy="2792413"/>
+          </a:xfrm>
+        </p:spPr>
+      </p:sp>
+      <p:sp>
+        <p:nvSpPr>
+          <p:cNvPr id="3" name="Notes Placeholder 2"/>
+          <p:cNvSpPr>
+            <a:spLocks noGrp="1"/>
+          </p:cNvSpPr>
+          <p:nvPr>
+            <p:ph type="body" idx="1"/>
+          </p:nvPr>
+        </p:nvSpPr>
+        <p:spPr/>
+        <p:txBody>
+          <a:bodyPr/>
+          <a:lstStyle/>
+          <a:p>
+            <a:endParaRPr lang="en-US"/>
+          </a:p>
+        </p:txBody>
+      </p:sp>
+      <p:sp>
+        <p:nvSpPr>
+          <p:cNvPr id="4" name="Slide Number Placeholder 3"/>
+          <p:cNvSpPr>
+            <a:spLocks noGrp="1"/>
+          </p:cNvSpPr>
+          <p:nvPr>
+            <p:ph type="sldNum" sz="quarter" idx="10"/>
+          </p:nvPr>
+        </p:nvSpPr>
+        <p:spPr/>
+        <p:txBody>
+          <a:bodyPr/>
+          <a:lstStyle/>
+          <a:p>
+            <a:pPr>
+              <a:lnSpc>
+                <a:spcPct val="93000"/>
+              </a:lnSpc>
+            </a:pPr>
+            <a:fld id="{785BB0B3-964C-4CDE-9D3D-0BF955B8C425}" type="slidenum">
+              <a:rPr lang="en-US" smtClean="0"/>
+              <a:pPr>
+                <a:lnSpc>
+                  <a:spcPct val="93000"/>
+                </a:lnSpc>
+              </a:pPr>
+              <a:t>20</a:t>
+            </a:fld>
+            <a:endParaRPr lang="en-US" dirty="0"/>
+          </a:p>
+        </p:txBody>
+      </p:sp>
+    </p:spTree>
+    <p:extLst>
+      <p:ext uri="{BB962C8B-B14F-4D97-AF65-F5344CB8AC3E}">
+        <p14:creationId xmlns:p14="http://schemas.microsoft.com/office/powerpoint/2010/main" val="1462073102"/>
       </p:ext>
     </p:extLst>
   </p:cSld>
@@ -3589,7 +4296,7 @@
     </p:spTree>
     <p:extLst>
       <p:ext uri="{BB962C8B-B14F-4D97-AF65-F5344CB8AC3E}">
-        <p14:creationId xmlns:p14="http://schemas.microsoft.com/office/powerpoint/2010/main" val="4072238610"/>
+        <p14:creationId xmlns:p14="http://schemas.microsoft.com/office/powerpoint/2010/main" val="1262465448"/>
       </p:ext>
     </p:extLst>
   </p:cSld>
@@ -3688,7 +4395,7 @@
     </p:spTree>
     <p:extLst>
       <p:ext uri="{BB962C8B-B14F-4D97-AF65-F5344CB8AC3E}">
-        <p14:creationId xmlns:p14="http://schemas.microsoft.com/office/powerpoint/2010/main" val="1231824617"/>
+        <p14:creationId xmlns:p14="http://schemas.microsoft.com/office/powerpoint/2010/main" val="4072238610"/>
       </p:ext>
     </p:extLst>
   </p:cSld>
@@ -3787,7 +4494,7 @@
     </p:spTree>
     <p:extLst>
       <p:ext uri="{BB962C8B-B14F-4D97-AF65-F5344CB8AC3E}">
-        <p14:creationId xmlns:p14="http://schemas.microsoft.com/office/powerpoint/2010/main" val="3708360235"/>
+        <p14:creationId xmlns:p14="http://schemas.microsoft.com/office/powerpoint/2010/main" val="1231824617"/>
       </p:ext>
     </p:extLst>
   </p:cSld>
@@ -3886,7 +4593,7 @@
     </p:spTree>
     <p:extLst>
       <p:ext uri="{BB962C8B-B14F-4D97-AF65-F5344CB8AC3E}">
-        <p14:creationId xmlns:p14="http://schemas.microsoft.com/office/powerpoint/2010/main" val="3254270098"/>
+        <p14:creationId xmlns:p14="http://schemas.microsoft.com/office/powerpoint/2010/main" val="3708360235"/>
       </p:ext>
     </p:extLst>
   </p:cSld>
@@ -3985,7 +4692,7 @@
     </p:spTree>
     <p:extLst>
       <p:ext uri="{BB962C8B-B14F-4D97-AF65-F5344CB8AC3E}">
-        <p14:creationId xmlns:p14="http://schemas.microsoft.com/office/powerpoint/2010/main" val="1076195960"/>
+        <p14:creationId xmlns:p14="http://schemas.microsoft.com/office/powerpoint/2010/main" val="3254270098"/>
       </p:ext>
     </p:extLst>
   </p:cSld>
@@ -44708,6 +45415,128 @@
           <a:p>
             <a:r>
               <a:rPr lang="en-US" dirty="0"/>
+              <a:t>AEC: EV vs Gain &amp; Exposure Time &amp; Sensitivity</a:t>
+            </a:r>
+          </a:p>
+        </p:txBody>
+      </p:sp>
+      <p:pic>
+        <p:nvPicPr>
+          <p:cNvPr id="8" name="Picture 7">
+            <a:extLst>
+              <a:ext uri="{FF2B5EF4-FFF2-40B4-BE49-F238E27FC236}">
+                <a16:creationId xmlns:a16="http://schemas.microsoft.com/office/drawing/2014/main" id="{58FCD94D-CFF5-4D08-B448-7F02C6A0B765}"/>
+              </a:ext>
+            </a:extLst>
+          </p:cNvPr>
+          <p:cNvPicPr>
+            <a:picLocks noChangeAspect="1"/>
+          </p:cNvPicPr>
+          <p:nvPr/>
+        </p:nvPicPr>
+        <p:blipFill>
+          <a:blip r:embed="rId3"/>
+          <a:stretch>
+            <a:fillRect/>
+          </a:stretch>
+        </p:blipFill>
+        <p:spPr>
+          <a:xfrm>
+            <a:off x="0" y="1505166"/>
+            <a:ext cx="12192000" cy="4986136"/>
+          </a:xfrm>
+          <a:prstGeom prst="rect">
+            <a:avLst/>
+          </a:prstGeom>
+        </p:spPr>
+      </p:pic>
+    </p:spTree>
+    <p:extLst>
+      <p:ext uri="{BB962C8B-B14F-4D97-AF65-F5344CB8AC3E}">
+        <p14:creationId xmlns:p14="http://schemas.microsoft.com/office/powerpoint/2010/main" val="4109322888"/>
+      </p:ext>
+    </p:extLst>
+  </p:cSld>
+  <p:clrMapOvr>
+    <a:masterClrMapping/>
+  </p:clrMapOvr>
+  <mc:AlternateContent xmlns:mc="http://schemas.openxmlformats.org/markup-compatibility/2006" xmlns:p14="http://schemas.microsoft.com/office/powerpoint/2010/main">
+    <mc:Choice Requires="p14">
+      <p:transition spd="med" p14:dur="700">
+        <p:fade/>
+      </p:transition>
+    </mc:Choice>
+    <mc:Fallback xmlns="">
+      <p:transition spd="med">
+        <p:fade/>
+      </p:transition>
+    </mc:Fallback>
+  </mc:AlternateContent>
+</p:sld>
+</file>
+
+<file path=ppt/slides/slide11.xml><?xml version="1.0" encoding="utf-8"?>
+<p:sld xmlns:a="http://schemas.openxmlformats.org/drawingml/2006/main" xmlns:r="http://schemas.openxmlformats.org/officeDocument/2006/relationships" xmlns:p="http://schemas.openxmlformats.org/presentationml/2006/main">
+  <p:cSld>
+    <p:spTree>
+      <p:nvGrpSpPr>
+        <p:cNvPr id="1" name=""/>
+        <p:cNvGrpSpPr/>
+        <p:nvPr/>
+      </p:nvGrpSpPr>
+      <p:grpSpPr>
+        <a:xfrm>
+          <a:off x="0" y="0"/>
+          <a:ext cx="0" cy="0"/>
+          <a:chOff x="0" y="0"/>
+          <a:chExt cx="0" cy="0"/>
+        </a:xfrm>
+      </p:grpSpPr>
+      <p:sp>
+        <p:nvSpPr>
+          <p:cNvPr id="2" name="Title 1"/>
+          <p:cNvSpPr>
+            <a:spLocks noGrp="1"/>
+          </p:cNvSpPr>
+          <p:nvPr>
+            <p:ph type="title"/>
+          </p:nvPr>
+        </p:nvSpPr>
+        <p:spPr/>
+        <p:txBody>
+          <a:bodyPr/>
+          <a:lstStyle/>
+          <a:p>
+            <a:r>
+              <a:rPr lang="en-US" dirty="0"/>
+              <a:t>Graph:</a:t>
+            </a:r>
+          </a:p>
+        </p:txBody>
+      </p:sp>
+      <p:sp>
+        <p:nvSpPr>
+          <p:cNvPr id="11" name="Subtitle 10">
+            <a:extLst>
+              <a:ext uri="{FF2B5EF4-FFF2-40B4-BE49-F238E27FC236}">
+                <a16:creationId xmlns:a16="http://schemas.microsoft.com/office/drawing/2014/main" id="{8228FD3F-C0A7-455C-928F-5ED86125C266}"/>
+              </a:ext>
+            </a:extLst>
+          </p:cNvPr>
+          <p:cNvSpPr>
+            <a:spLocks noGrp="1"/>
+          </p:cNvSpPr>
+          <p:nvPr>
+            <p:ph type="subTitle" idx="1"/>
+          </p:nvPr>
+        </p:nvSpPr>
+        <p:spPr/>
+        <p:txBody>
+          <a:bodyPr/>
+          <a:lstStyle/>
+          <a:p>
+            <a:r>
+              <a:rPr lang="en-US" dirty="0"/>
               <a:t>AEC: Metering mode vs Gain &amp; Exposure Time</a:t>
             </a:r>
           </a:p>
@@ -44768,7 +45597,7 @@
 </p:sld>
 </file>
 
-<file path=ppt/slides/slide11.xml><?xml version="1.0" encoding="utf-8"?>
+<file path=ppt/slides/slide12.xml><?xml version="1.0" encoding="utf-8"?>
 <p:sld xmlns:a="http://schemas.openxmlformats.org/drawingml/2006/main" xmlns:r="http://schemas.openxmlformats.org/officeDocument/2006/relationships" xmlns:p="http://schemas.openxmlformats.org/presentationml/2006/main">
   <p:cSld>
     <p:spTree>
@@ -44858,7 +45687,7 @@
         <p:spPr>
           <a:xfrm>
             <a:off x="0" y="1505166"/>
-            <a:ext cx="12191999" cy="4986136"/>
+            <a:ext cx="12192000" cy="4986136"/>
           </a:xfrm>
           <a:prstGeom prst="rect">
             <a:avLst/>
@@ -44890,7 +45719,378 @@
 </p:sld>
 </file>
 
-<file path=ppt/slides/slide12.xml><?xml version="1.0" encoding="utf-8"?>
+<file path=ppt/slides/slide13.xml><?xml version="1.0" encoding="utf-8"?>
+<p:sld xmlns:a="http://schemas.openxmlformats.org/drawingml/2006/main" xmlns:r="http://schemas.openxmlformats.org/officeDocument/2006/relationships" xmlns:p="http://schemas.openxmlformats.org/presentationml/2006/main">
+  <p:cSld>
+    <p:spTree>
+      <p:nvGrpSpPr>
+        <p:cNvPr id="1" name=""/>
+        <p:cNvGrpSpPr/>
+        <p:nvPr/>
+      </p:nvGrpSpPr>
+      <p:grpSpPr>
+        <a:xfrm>
+          <a:off x="0" y="0"/>
+          <a:ext cx="0" cy="0"/>
+          <a:chOff x="0" y="0"/>
+          <a:chExt cx="0" cy="0"/>
+        </a:xfrm>
+      </p:grpSpPr>
+      <p:sp>
+        <p:nvSpPr>
+          <p:cNvPr id="2" name="Title 1"/>
+          <p:cNvSpPr>
+            <a:spLocks noGrp="1"/>
+          </p:cNvSpPr>
+          <p:nvPr>
+            <p:ph type="title"/>
+          </p:nvPr>
+        </p:nvSpPr>
+        <p:spPr/>
+        <p:txBody>
+          <a:bodyPr/>
+          <a:lstStyle/>
+          <a:p>
+            <a:r>
+              <a:rPr lang="en-US" dirty="0"/>
+              <a:t>Graph:</a:t>
+            </a:r>
+          </a:p>
+        </p:txBody>
+      </p:sp>
+      <p:sp>
+        <p:nvSpPr>
+          <p:cNvPr id="11" name="Subtitle 10">
+            <a:extLst>
+              <a:ext uri="{FF2B5EF4-FFF2-40B4-BE49-F238E27FC236}">
+                <a16:creationId xmlns:a16="http://schemas.microsoft.com/office/drawing/2014/main" id="{8228FD3F-C0A7-455C-928F-5ED86125C266}"/>
+              </a:ext>
+            </a:extLst>
+          </p:cNvPr>
+          <p:cNvSpPr>
+            <a:spLocks noGrp="1"/>
+          </p:cNvSpPr>
+          <p:nvPr>
+            <p:ph type="subTitle" idx="1"/>
+          </p:nvPr>
+        </p:nvSpPr>
+        <p:spPr/>
+        <p:txBody>
+          <a:bodyPr/>
+          <a:lstStyle/>
+          <a:p>
+            <a:r>
+              <a:rPr lang="en-US" dirty="0"/>
+              <a:t>AEC: Preview with multiple cameras</a:t>
+            </a:r>
+          </a:p>
+        </p:txBody>
+      </p:sp>
+      <p:pic>
+        <p:nvPicPr>
+          <p:cNvPr id="8" name="Picture 7">
+            <a:extLst>
+              <a:ext uri="{FF2B5EF4-FFF2-40B4-BE49-F238E27FC236}">
+                <a16:creationId xmlns:a16="http://schemas.microsoft.com/office/drawing/2014/main" id="{58FCD94D-CFF5-4D08-B448-7F02C6A0B765}"/>
+              </a:ext>
+            </a:extLst>
+          </p:cNvPr>
+          <p:cNvPicPr>
+            <a:picLocks noChangeAspect="1"/>
+          </p:cNvPicPr>
+          <p:nvPr/>
+        </p:nvPicPr>
+        <p:blipFill>
+          <a:blip r:embed="rId3"/>
+          <a:stretch>
+            <a:fillRect/>
+          </a:stretch>
+        </p:blipFill>
+        <p:spPr>
+          <a:xfrm>
+            <a:off x="0" y="1505166"/>
+            <a:ext cx="12192000" cy="4986136"/>
+          </a:xfrm>
+          <a:prstGeom prst="rect">
+            <a:avLst/>
+          </a:prstGeom>
+        </p:spPr>
+      </p:pic>
+    </p:spTree>
+    <p:extLst>
+      <p:ext uri="{BB962C8B-B14F-4D97-AF65-F5344CB8AC3E}">
+        <p14:creationId xmlns:p14="http://schemas.microsoft.com/office/powerpoint/2010/main" val="130645225"/>
+      </p:ext>
+    </p:extLst>
+  </p:cSld>
+  <p:clrMapOvr>
+    <a:masterClrMapping/>
+  </p:clrMapOvr>
+  <mc:AlternateContent xmlns:mc="http://schemas.openxmlformats.org/markup-compatibility/2006" xmlns:p14="http://schemas.microsoft.com/office/powerpoint/2010/main">
+    <mc:Choice Requires="p14">
+      <p:transition spd="med" p14:dur="700">
+        <p:fade/>
+      </p:transition>
+    </mc:Choice>
+    <mc:Fallback xmlns="">
+      <p:transition spd="med">
+        <p:fade/>
+      </p:transition>
+    </mc:Fallback>
+  </mc:AlternateContent>
+</p:sld>
+</file>
+
+<file path=ppt/slides/slide14.xml><?xml version="1.0" encoding="utf-8"?>
+<p:sld xmlns:a="http://schemas.openxmlformats.org/drawingml/2006/main" xmlns:r="http://schemas.openxmlformats.org/officeDocument/2006/relationships" xmlns:p="http://schemas.openxmlformats.org/presentationml/2006/main">
+  <p:cSld>
+    <p:spTree>
+      <p:nvGrpSpPr>
+        <p:cNvPr id="1" name=""/>
+        <p:cNvGrpSpPr/>
+        <p:nvPr/>
+      </p:nvGrpSpPr>
+      <p:grpSpPr>
+        <a:xfrm>
+          <a:off x="0" y="0"/>
+          <a:ext cx="0" cy="0"/>
+          <a:chOff x="0" y="0"/>
+          <a:chExt cx="0" cy="0"/>
+        </a:xfrm>
+      </p:grpSpPr>
+      <p:sp>
+        <p:nvSpPr>
+          <p:cNvPr id="2" name="Title 1"/>
+          <p:cNvSpPr>
+            <a:spLocks noGrp="1"/>
+          </p:cNvSpPr>
+          <p:nvPr>
+            <p:ph type="title"/>
+          </p:nvPr>
+        </p:nvSpPr>
+        <p:spPr/>
+        <p:txBody>
+          <a:bodyPr/>
+          <a:lstStyle/>
+          <a:p>
+            <a:r>
+              <a:rPr lang="en-US" dirty="0"/>
+              <a:t>Graph:</a:t>
+            </a:r>
+          </a:p>
+        </p:txBody>
+      </p:sp>
+      <p:sp>
+        <p:nvSpPr>
+          <p:cNvPr id="11" name="Subtitle 10">
+            <a:extLst>
+              <a:ext uri="{FF2B5EF4-FFF2-40B4-BE49-F238E27FC236}">
+                <a16:creationId xmlns:a16="http://schemas.microsoft.com/office/drawing/2014/main" id="{8228FD3F-C0A7-455C-928F-5ED86125C266}"/>
+              </a:ext>
+            </a:extLst>
+          </p:cNvPr>
+          <p:cNvSpPr>
+            <a:spLocks noGrp="1"/>
+          </p:cNvSpPr>
+          <p:nvPr>
+            <p:ph type="subTitle" idx="1"/>
+          </p:nvPr>
+        </p:nvSpPr>
+        <p:spPr/>
+        <p:txBody>
+          <a:bodyPr/>
+          <a:lstStyle/>
+          <a:p>
+            <a:r>
+              <a:rPr lang="en-US" dirty="0"/>
+              <a:t>AEC: Preview with camera ID 0</a:t>
+            </a:r>
+          </a:p>
+        </p:txBody>
+      </p:sp>
+      <p:pic>
+        <p:nvPicPr>
+          <p:cNvPr id="8" name="Picture 7">
+            <a:extLst>
+              <a:ext uri="{FF2B5EF4-FFF2-40B4-BE49-F238E27FC236}">
+                <a16:creationId xmlns:a16="http://schemas.microsoft.com/office/drawing/2014/main" id="{58FCD94D-CFF5-4D08-B448-7F02C6A0B765}"/>
+              </a:ext>
+            </a:extLst>
+          </p:cNvPr>
+          <p:cNvPicPr>
+            <a:picLocks noChangeAspect="1"/>
+          </p:cNvPicPr>
+          <p:nvPr/>
+        </p:nvPicPr>
+        <p:blipFill>
+          <a:blip r:embed="rId3"/>
+          <a:stretch>
+            <a:fillRect/>
+          </a:stretch>
+        </p:blipFill>
+        <p:spPr>
+          <a:xfrm>
+            <a:off x="0" y="1505166"/>
+            <a:ext cx="12192000" cy="4986136"/>
+          </a:xfrm>
+          <a:prstGeom prst="rect">
+            <a:avLst/>
+          </a:prstGeom>
+        </p:spPr>
+      </p:pic>
+    </p:spTree>
+    <p:extLst>
+      <p:ext uri="{BB962C8B-B14F-4D97-AF65-F5344CB8AC3E}">
+        <p14:creationId xmlns:p14="http://schemas.microsoft.com/office/powerpoint/2010/main" val="2897219044"/>
+      </p:ext>
+    </p:extLst>
+  </p:cSld>
+  <p:clrMapOvr>
+    <a:masterClrMapping/>
+  </p:clrMapOvr>
+  <mc:AlternateContent xmlns:mc="http://schemas.openxmlformats.org/markup-compatibility/2006" xmlns:p14="http://schemas.microsoft.com/office/powerpoint/2010/main">
+    <mc:Choice Requires="p14">
+      <p:transition spd="med" p14:dur="700">
+        <p:fade/>
+      </p:transition>
+    </mc:Choice>
+    <mc:Fallback xmlns="">
+      <p:transition spd="med">
+        <p:fade/>
+      </p:transition>
+    </mc:Fallback>
+  </mc:AlternateContent>
+</p:sld>
+</file>
+
+<file path=ppt/slides/slide15.xml><?xml version="1.0" encoding="utf-8"?>
+<p:sld xmlns:a="http://schemas.openxmlformats.org/drawingml/2006/main" xmlns:r="http://schemas.openxmlformats.org/officeDocument/2006/relationships" xmlns:p="http://schemas.openxmlformats.org/presentationml/2006/main">
+  <p:cSld>
+    <p:spTree>
+      <p:nvGrpSpPr>
+        <p:cNvPr id="1" name=""/>
+        <p:cNvGrpSpPr/>
+        <p:nvPr/>
+      </p:nvGrpSpPr>
+      <p:grpSpPr>
+        <a:xfrm>
+          <a:off x="0" y="0"/>
+          <a:ext cx="0" cy="0"/>
+          <a:chOff x="0" y="0"/>
+          <a:chExt cx="0" cy="0"/>
+        </a:xfrm>
+      </p:grpSpPr>
+      <p:sp>
+        <p:nvSpPr>
+          <p:cNvPr id="2" name="Title 1"/>
+          <p:cNvSpPr>
+            <a:spLocks noGrp="1"/>
+          </p:cNvSpPr>
+          <p:nvPr>
+            <p:ph type="title"/>
+          </p:nvPr>
+        </p:nvSpPr>
+        <p:spPr/>
+        <p:txBody>
+          <a:bodyPr/>
+          <a:lstStyle/>
+          <a:p>
+            <a:r>
+              <a:rPr lang="en-US" dirty="0"/>
+              <a:t>Graph:</a:t>
+            </a:r>
+          </a:p>
+        </p:txBody>
+      </p:sp>
+      <p:sp>
+        <p:nvSpPr>
+          <p:cNvPr id="11" name="Subtitle 10">
+            <a:extLst>
+              <a:ext uri="{FF2B5EF4-FFF2-40B4-BE49-F238E27FC236}">
+                <a16:creationId xmlns:a16="http://schemas.microsoft.com/office/drawing/2014/main" id="{8228FD3F-C0A7-455C-928F-5ED86125C266}"/>
+              </a:ext>
+            </a:extLst>
+          </p:cNvPr>
+          <p:cNvSpPr>
+            <a:spLocks noGrp="1"/>
+          </p:cNvSpPr>
+          <p:nvPr>
+            <p:ph type="subTitle" idx="1"/>
+          </p:nvPr>
+        </p:nvSpPr>
+        <p:spPr>
+          <a:xfrm>
+            <a:off x="495300" y="1132232"/>
+            <a:ext cx="11187112" cy="431657"/>
+          </a:xfrm>
+        </p:spPr>
+        <p:txBody>
+          <a:bodyPr/>
+          <a:lstStyle/>
+          <a:p>
+            <a:r>
+              <a:rPr lang="en-US" dirty="0"/>
+              <a:t>AEC: Preview with camera ID 1</a:t>
+            </a:r>
+          </a:p>
+        </p:txBody>
+      </p:sp>
+      <p:pic>
+        <p:nvPicPr>
+          <p:cNvPr id="8" name="Picture 7">
+            <a:extLst>
+              <a:ext uri="{FF2B5EF4-FFF2-40B4-BE49-F238E27FC236}">
+                <a16:creationId xmlns:a16="http://schemas.microsoft.com/office/drawing/2014/main" id="{58FCD94D-CFF5-4D08-B448-7F02C6A0B765}"/>
+              </a:ext>
+            </a:extLst>
+          </p:cNvPr>
+          <p:cNvPicPr>
+            <a:picLocks noChangeAspect="1"/>
+          </p:cNvPicPr>
+          <p:nvPr/>
+        </p:nvPicPr>
+        <p:blipFill>
+          <a:blip r:embed="rId3"/>
+          <a:stretch>
+            <a:fillRect/>
+          </a:stretch>
+        </p:blipFill>
+        <p:spPr>
+          <a:xfrm>
+            <a:off x="0" y="1505166"/>
+            <a:ext cx="12192000" cy="4986136"/>
+          </a:xfrm>
+          <a:prstGeom prst="rect">
+            <a:avLst/>
+          </a:prstGeom>
+        </p:spPr>
+      </p:pic>
+    </p:spTree>
+    <p:extLst>
+      <p:ext uri="{BB962C8B-B14F-4D97-AF65-F5344CB8AC3E}">
+        <p14:creationId xmlns:p14="http://schemas.microsoft.com/office/powerpoint/2010/main" val="492851341"/>
+      </p:ext>
+    </p:extLst>
+  </p:cSld>
+  <p:clrMapOvr>
+    <a:masterClrMapping/>
+  </p:clrMapOvr>
+  <mc:AlternateContent xmlns:mc="http://schemas.openxmlformats.org/markup-compatibility/2006" xmlns:p14="http://schemas.microsoft.com/office/powerpoint/2010/main">
+    <mc:Choice Requires="p14">
+      <p:transition spd="med" p14:dur="700">
+        <p:fade/>
+      </p:transition>
+    </mc:Choice>
+    <mc:Fallback xmlns="">
+      <p:transition spd="med">
+        <p:fade/>
+      </p:transition>
+    </mc:Fallback>
+  </mc:AlternateContent>
+</p:sld>
+</file>
+
+<file path=ppt/slides/slide16.xml><?xml version="1.0" encoding="utf-8"?>
 <p:sld xmlns:a="http://schemas.openxmlformats.org/drawingml/2006/main" xmlns:r="http://schemas.openxmlformats.org/officeDocument/2006/relationships" xmlns:p="http://schemas.openxmlformats.org/presentationml/2006/main">
   <p:cSld>
     <p:spTree>
@@ -45012,7 +46212,7 @@
 </p:sld>
 </file>
 
-<file path=ppt/slides/slide13.xml><?xml version="1.0" encoding="utf-8"?>
+<file path=ppt/slides/slide17.xml><?xml version="1.0" encoding="utf-8"?>
 <p:sld xmlns:a="http://schemas.openxmlformats.org/drawingml/2006/main" xmlns:r="http://schemas.openxmlformats.org/officeDocument/2006/relationships" xmlns:p="http://schemas.openxmlformats.org/presentationml/2006/main">
   <p:cSld>
     <p:spTree>
@@ -45134,7 +46334,7 @@
 </p:sld>
 </file>
 
-<file path=ppt/slides/slide14.xml><?xml version="1.0" encoding="utf-8"?>
+<file path=ppt/slides/slide18.xml><?xml version="1.0" encoding="utf-8"?>
 <p:sld xmlns:a="http://schemas.openxmlformats.org/drawingml/2006/main" xmlns:r="http://schemas.openxmlformats.org/officeDocument/2006/relationships" xmlns:p="http://schemas.openxmlformats.org/presentationml/2006/main">
   <p:cSld>
     <p:spTree>
@@ -45151,10 +46351,212 @@
           <a:chExt cx="0" cy="0"/>
         </a:xfrm>
       </p:grpSpPr>
+      <p:sp>
+        <p:nvSpPr>
+          <p:cNvPr id="2" name="Title 1"/>
+          <p:cNvSpPr>
+            <a:spLocks noGrp="1"/>
+          </p:cNvSpPr>
+          <p:nvPr>
+            <p:ph type="title"/>
+          </p:nvPr>
+        </p:nvSpPr>
+        <p:spPr/>
+        <p:txBody>
+          <a:bodyPr/>
+          <a:lstStyle/>
+          <a:p>
+            <a:r>
+              <a:rPr lang="en-US" dirty="0"/>
+              <a:t>Graph:</a:t>
+            </a:r>
+          </a:p>
+        </p:txBody>
+      </p:sp>
+      <p:sp>
+        <p:nvSpPr>
+          <p:cNvPr id="11" name="Subtitle 10">
+            <a:extLst>
+              <a:ext uri="{FF2B5EF4-FFF2-40B4-BE49-F238E27FC236}">
+                <a16:creationId xmlns:a16="http://schemas.microsoft.com/office/drawing/2014/main" id="{8228FD3F-C0A7-455C-928F-5ED86125C266}"/>
+              </a:ext>
+            </a:extLst>
+          </p:cNvPr>
+          <p:cNvSpPr>
+            <a:spLocks noGrp="1"/>
+          </p:cNvSpPr>
+          <p:nvPr>
+            <p:ph type="subTitle" idx="1"/>
+          </p:nvPr>
+        </p:nvSpPr>
+        <p:spPr/>
+        <p:txBody>
+          <a:bodyPr/>
+          <a:lstStyle/>
+          <a:p>
+            <a:r>
+              <a:rPr lang="en-US" dirty="0"/>
+              <a:t>AWB: Preview with multiple cameras</a:t>
+            </a:r>
+          </a:p>
+        </p:txBody>
+      </p:sp>
+      <p:pic>
+        <p:nvPicPr>
+          <p:cNvPr id="8" name="Picture 7">
+            <a:extLst>
+              <a:ext uri="{FF2B5EF4-FFF2-40B4-BE49-F238E27FC236}">
+                <a16:creationId xmlns:a16="http://schemas.microsoft.com/office/drawing/2014/main" id="{58FCD94D-CFF5-4D08-B448-7F02C6A0B765}"/>
+              </a:ext>
+            </a:extLst>
+          </p:cNvPr>
+          <p:cNvPicPr>
+            <a:picLocks noChangeAspect="1"/>
+          </p:cNvPicPr>
+          <p:nvPr/>
+        </p:nvPicPr>
+        <p:blipFill>
+          <a:blip r:embed="rId3"/>
+          <a:stretch>
+            <a:fillRect/>
+          </a:stretch>
+        </p:blipFill>
+        <p:spPr>
+          <a:xfrm>
+            <a:off x="0" y="1505166"/>
+            <a:ext cx="12192000" cy="4986136"/>
+          </a:xfrm>
+          <a:prstGeom prst="rect">
+            <a:avLst/>
+          </a:prstGeom>
+        </p:spPr>
+      </p:pic>
     </p:spTree>
     <p:extLst>
       <p:ext uri="{BB962C8B-B14F-4D97-AF65-F5344CB8AC3E}">
-        <p14:creationId xmlns:p14="http://schemas.microsoft.com/office/powerpoint/2010/main" val="2148587379"/>
+        <p14:creationId xmlns:p14="http://schemas.microsoft.com/office/powerpoint/2010/main" val="3444261796"/>
+      </p:ext>
+    </p:extLst>
+  </p:cSld>
+  <p:clrMapOvr>
+    <a:masterClrMapping/>
+  </p:clrMapOvr>
+  <mc:AlternateContent xmlns:mc="http://schemas.openxmlformats.org/markup-compatibility/2006" xmlns:p14="http://schemas.microsoft.com/office/powerpoint/2010/main">
+    <mc:Choice Requires="p14">
+      <p:transition spd="med" p14:dur="700">
+        <p:fade/>
+      </p:transition>
+    </mc:Choice>
+    <mc:Fallback xmlns="">
+      <p:transition spd="med">
+        <p:fade/>
+      </p:transition>
+    </mc:Fallback>
+  </mc:AlternateContent>
+</p:sld>
+</file>
+
+<file path=ppt/slides/slide19.xml><?xml version="1.0" encoding="utf-8"?>
+<p:sld xmlns:a="http://schemas.openxmlformats.org/drawingml/2006/main" xmlns:r="http://schemas.openxmlformats.org/officeDocument/2006/relationships" xmlns:p="http://schemas.openxmlformats.org/presentationml/2006/main">
+  <p:cSld>
+    <p:spTree>
+      <p:nvGrpSpPr>
+        <p:cNvPr id="1" name=""/>
+        <p:cNvGrpSpPr/>
+        <p:nvPr/>
+      </p:nvGrpSpPr>
+      <p:grpSpPr>
+        <a:xfrm>
+          <a:off x="0" y="0"/>
+          <a:ext cx="0" cy="0"/>
+          <a:chOff x="0" y="0"/>
+          <a:chExt cx="0" cy="0"/>
+        </a:xfrm>
+      </p:grpSpPr>
+      <p:sp>
+        <p:nvSpPr>
+          <p:cNvPr id="2" name="Title 1"/>
+          <p:cNvSpPr>
+            <a:spLocks noGrp="1"/>
+          </p:cNvSpPr>
+          <p:nvPr>
+            <p:ph type="title"/>
+          </p:nvPr>
+        </p:nvSpPr>
+        <p:spPr/>
+        <p:txBody>
+          <a:bodyPr/>
+          <a:lstStyle/>
+          <a:p>
+            <a:r>
+              <a:rPr lang="en-US" dirty="0"/>
+              <a:t>Graph:</a:t>
+            </a:r>
+          </a:p>
+        </p:txBody>
+      </p:sp>
+      <p:sp>
+        <p:nvSpPr>
+          <p:cNvPr id="11" name="Subtitle 10">
+            <a:extLst>
+              <a:ext uri="{FF2B5EF4-FFF2-40B4-BE49-F238E27FC236}">
+                <a16:creationId xmlns:a16="http://schemas.microsoft.com/office/drawing/2014/main" id="{8228FD3F-C0A7-455C-928F-5ED86125C266}"/>
+              </a:ext>
+            </a:extLst>
+          </p:cNvPr>
+          <p:cNvSpPr>
+            <a:spLocks noGrp="1"/>
+          </p:cNvSpPr>
+          <p:nvPr>
+            <p:ph type="subTitle" idx="1"/>
+          </p:nvPr>
+        </p:nvSpPr>
+        <p:spPr/>
+        <p:txBody>
+          <a:bodyPr/>
+          <a:lstStyle/>
+          <a:p>
+            <a:r>
+              <a:rPr lang="en-US" dirty="0"/>
+              <a:t>AWB: Preview with camera ID 0</a:t>
+            </a:r>
+          </a:p>
+        </p:txBody>
+      </p:sp>
+      <p:pic>
+        <p:nvPicPr>
+          <p:cNvPr id="8" name="Picture 7">
+            <a:extLst>
+              <a:ext uri="{FF2B5EF4-FFF2-40B4-BE49-F238E27FC236}">
+                <a16:creationId xmlns:a16="http://schemas.microsoft.com/office/drawing/2014/main" id="{58FCD94D-CFF5-4D08-B448-7F02C6A0B765}"/>
+              </a:ext>
+            </a:extLst>
+          </p:cNvPr>
+          <p:cNvPicPr>
+            <a:picLocks noChangeAspect="1"/>
+          </p:cNvPicPr>
+          <p:nvPr/>
+        </p:nvPicPr>
+        <p:blipFill>
+          <a:blip r:embed="rId3"/>
+          <a:stretch>
+            <a:fillRect/>
+          </a:stretch>
+        </p:blipFill>
+        <p:spPr>
+          <a:xfrm>
+            <a:off x="0" y="1505166"/>
+            <a:ext cx="12192000" cy="4986136"/>
+          </a:xfrm>
+          <a:prstGeom prst="rect">
+            <a:avLst/>
+          </a:prstGeom>
+        </p:spPr>
+      </p:pic>
+    </p:spTree>
+    <p:extLst>
+      <p:ext uri="{BB962C8B-B14F-4D97-AF65-F5344CB8AC3E}">
+        <p14:creationId xmlns:p14="http://schemas.microsoft.com/office/powerpoint/2010/main" val="159159868"/>
       </p:ext>
     </p:extLst>
   </p:cSld>
@@ -45395,6 +46797,175 @@
     <p:extLst>
       <p:ext uri="{BB962C8B-B14F-4D97-AF65-F5344CB8AC3E}">
         <p14:creationId xmlns:p14="http://schemas.microsoft.com/office/powerpoint/2010/main" val="870665549"/>
+      </p:ext>
+    </p:extLst>
+  </p:cSld>
+  <p:clrMapOvr>
+    <a:masterClrMapping/>
+  </p:clrMapOvr>
+  <mc:AlternateContent xmlns:mc="http://schemas.openxmlformats.org/markup-compatibility/2006" xmlns:p14="http://schemas.microsoft.com/office/powerpoint/2010/main">
+    <mc:Choice Requires="p14">
+      <p:transition spd="med" p14:dur="700">
+        <p:fade/>
+      </p:transition>
+    </mc:Choice>
+    <mc:Fallback xmlns="">
+      <p:transition spd="med">
+        <p:fade/>
+      </p:transition>
+    </mc:Fallback>
+  </mc:AlternateContent>
+</p:sld>
+</file>
+
+<file path=ppt/slides/slide20.xml><?xml version="1.0" encoding="utf-8"?>
+<p:sld xmlns:a="http://schemas.openxmlformats.org/drawingml/2006/main" xmlns:r="http://schemas.openxmlformats.org/officeDocument/2006/relationships" xmlns:p="http://schemas.openxmlformats.org/presentationml/2006/main">
+  <p:cSld>
+    <p:spTree>
+      <p:nvGrpSpPr>
+        <p:cNvPr id="1" name=""/>
+        <p:cNvGrpSpPr/>
+        <p:nvPr/>
+      </p:nvGrpSpPr>
+      <p:grpSpPr>
+        <a:xfrm>
+          <a:off x="0" y="0"/>
+          <a:ext cx="0" cy="0"/>
+          <a:chOff x="0" y="0"/>
+          <a:chExt cx="0" cy="0"/>
+        </a:xfrm>
+      </p:grpSpPr>
+      <p:sp>
+        <p:nvSpPr>
+          <p:cNvPr id="2" name="Title 1"/>
+          <p:cNvSpPr>
+            <a:spLocks noGrp="1"/>
+          </p:cNvSpPr>
+          <p:nvPr>
+            <p:ph type="title"/>
+          </p:nvPr>
+        </p:nvSpPr>
+        <p:spPr/>
+        <p:txBody>
+          <a:bodyPr/>
+          <a:lstStyle/>
+          <a:p>
+            <a:r>
+              <a:rPr lang="en-US" dirty="0"/>
+              <a:t>Graph:</a:t>
+            </a:r>
+          </a:p>
+        </p:txBody>
+      </p:sp>
+      <p:sp>
+        <p:nvSpPr>
+          <p:cNvPr id="11" name="Subtitle 10">
+            <a:extLst>
+              <a:ext uri="{FF2B5EF4-FFF2-40B4-BE49-F238E27FC236}">
+                <a16:creationId xmlns:a16="http://schemas.microsoft.com/office/drawing/2014/main" id="{8228FD3F-C0A7-455C-928F-5ED86125C266}"/>
+              </a:ext>
+            </a:extLst>
+          </p:cNvPr>
+          <p:cNvSpPr>
+            <a:spLocks noGrp="1"/>
+          </p:cNvSpPr>
+          <p:nvPr>
+            <p:ph type="subTitle" idx="1"/>
+          </p:nvPr>
+        </p:nvSpPr>
+        <p:spPr>
+          <a:xfrm>
+            <a:off x="495300" y="1132232"/>
+            <a:ext cx="11187112" cy="431657"/>
+          </a:xfrm>
+        </p:spPr>
+        <p:txBody>
+          <a:bodyPr/>
+          <a:lstStyle/>
+          <a:p>
+            <a:r>
+              <a:rPr lang="en-US" dirty="0"/>
+              <a:t>AWB: Preview with camera ID 1</a:t>
+            </a:r>
+          </a:p>
+        </p:txBody>
+      </p:sp>
+      <p:pic>
+        <p:nvPicPr>
+          <p:cNvPr id="8" name="Picture 7">
+            <a:extLst>
+              <a:ext uri="{FF2B5EF4-FFF2-40B4-BE49-F238E27FC236}">
+                <a16:creationId xmlns:a16="http://schemas.microsoft.com/office/drawing/2014/main" id="{58FCD94D-CFF5-4D08-B448-7F02C6A0B765}"/>
+              </a:ext>
+            </a:extLst>
+          </p:cNvPr>
+          <p:cNvPicPr>
+            <a:picLocks noChangeAspect="1"/>
+          </p:cNvPicPr>
+          <p:nvPr/>
+        </p:nvPicPr>
+        <p:blipFill>
+          <a:blip r:embed="rId3"/>
+          <a:stretch>
+            <a:fillRect/>
+          </a:stretch>
+        </p:blipFill>
+        <p:spPr>
+          <a:xfrm>
+            <a:off x="0" y="1505166"/>
+            <a:ext cx="12192000" cy="4986136"/>
+          </a:xfrm>
+          <a:prstGeom prst="rect">
+            <a:avLst/>
+          </a:prstGeom>
+        </p:spPr>
+      </p:pic>
+    </p:spTree>
+    <p:extLst>
+      <p:ext uri="{BB962C8B-B14F-4D97-AF65-F5344CB8AC3E}">
+        <p14:creationId xmlns:p14="http://schemas.microsoft.com/office/powerpoint/2010/main" val="529915820"/>
+      </p:ext>
+    </p:extLst>
+  </p:cSld>
+  <p:clrMapOvr>
+    <a:masterClrMapping/>
+  </p:clrMapOvr>
+  <mc:AlternateContent xmlns:mc="http://schemas.openxmlformats.org/markup-compatibility/2006" xmlns:p14="http://schemas.microsoft.com/office/powerpoint/2010/main">
+    <mc:Choice Requires="p14">
+      <p:transition spd="med" p14:dur="700">
+        <p:fade/>
+      </p:transition>
+    </mc:Choice>
+    <mc:Fallback xmlns="">
+      <p:transition spd="med">
+        <p:fade/>
+      </p:transition>
+    </mc:Fallback>
+  </mc:AlternateContent>
+</p:sld>
+</file>
+
+<file path=ppt/slides/slide21.xml><?xml version="1.0" encoding="utf-8"?>
+<p:sld xmlns:a="http://schemas.openxmlformats.org/drawingml/2006/main" xmlns:r="http://schemas.openxmlformats.org/officeDocument/2006/relationships" xmlns:p="http://schemas.openxmlformats.org/presentationml/2006/main">
+  <p:cSld>
+    <p:spTree>
+      <p:nvGrpSpPr>
+        <p:cNvPr id="1" name=""/>
+        <p:cNvGrpSpPr/>
+        <p:nvPr/>
+      </p:nvGrpSpPr>
+      <p:grpSpPr>
+        <a:xfrm>
+          <a:off x="0" y="0"/>
+          <a:ext cx="0" cy="0"/>
+          <a:chOff x="0" y="0"/>
+          <a:chExt cx="0" cy="0"/>
+        </a:xfrm>
+      </p:grpSpPr>
+    </p:spTree>
+    <p:extLst>
+      <p:ext uri="{BB962C8B-B14F-4D97-AF65-F5344CB8AC3E}">
+        <p14:creationId xmlns:p14="http://schemas.microsoft.com/office/powerpoint/2010/main" val="2148587379"/>
       </p:ext>
     </p:extLst>
   </p:cSld>
@@ -45665,7 +47236,7 @@
             </a:r>
             <a:r>
               <a:rPr lang="en-US" dirty="0"/>
-              <a:t> log parser, use below command</a:t>
+              <a:t> log parser, follow below steps</a:t>
             </a:r>
           </a:p>
           <a:p>
@@ -45674,7 +47245,7 @@
             </a:pPr>
             <a:r>
               <a:rPr lang="en-US" b="1" dirty="0"/>
-              <a:t>Command: </a:t>
+              <a:t>Step1: </a:t>
             </a:r>
             <a:r>
               <a:rPr lang="en-US" dirty="0"/>
@@ -45687,7 +47258,7 @@
             </a:pPr>
             <a:r>
               <a:rPr lang="en-US" dirty="0"/>
-              <a:t>Then choose any one option to plot the graph.</a:t>
+              <a:t>Step2: Then choose any one option to plot the graph.</a:t>
             </a:r>
           </a:p>
           <a:p>
@@ -45720,7 +47291,7 @@
         </p:blipFill>
         <p:spPr>
           <a:xfrm>
-            <a:off x="505968" y="2983597"/>
+            <a:off x="495300" y="2597703"/>
             <a:ext cx="9353550" cy="2686050"/>
           </a:xfrm>
           <a:prstGeom prst="rect">
@@ -45804,8 +47375,8 @@
         </p:nvSpPr>
         <p:spPr>
           <a:xfrm>
-            <a:off x="495300" y="1149292"/>
-            <a:ext cx="11190732" cy="5217952"/>
+            <a:off x="495300" y="1285438"/>
+            <a:ext cx="11190732" cy="5081806"/>
           </a:xfrm>
         </p:spPr>
         <p:txBody>
@@ -45816,30 +47387,43 @@
               <a:buNone/>
             </a:pPr>
             <a:r>
-              <a:rPr lang="en-US" dirty="0"/>
-              <a:t>To run </a:t>
-            </a:r>
-            <a:r>
               <a:rPr lang="en-US" b="1" dirty="0"/>
-              <a:t>AWB</a:t>
+              <a:t>Step3: </a:t>
             </a:r>
             <a:r>
               <a:rPr lang="en-US" dirty="0"/>
-              <a:t> log parser, use below command</a:t>
+              <a:t>Enter camera ID (0,1,…, etc. or -1 to show graph for all the available camera ids)</a:t>
             </a:r>
           </a:p>
           <a:p>
             <a:pPr lvl="6">
               <a:buNone/>
             </a:pPr>
-            <a:r>
-              <a:rPr lang="en-US" b="1" dirty="0"/>
-              <a:t>Command: </a:t>
-            </a:r>
-            <a:r>
-              <a:rPr lang="en-US" dirty="0"/>
-              <a:t>python ParseLog.py &lt;File name or file path&gt;</a:t>
-            </a:r>
+            <a:endParaRPr lang="en-US" dirty="0"/>
+          </a:p>
+          <a:p>
+            <a:pPr lvl="6">
+              <a:buNone/>
+            </a:pPr>
+            <a:endParaRPr lang="en-US" dirty="0"/>
+          </a:p>
+          <a:p>
+            <a:pPr lvl="6">
+              <a:buNone/>
+            </a:pPr>
+            <a:endParaRPr lang="en-US" dirty="0"/>
+          </a:p>
+          <a:p>
+            <a:pPr lvl="6">
+              <a:buNone/>
+            </a:pPr>
+            <a:endParaRPr lang="en-US" dirty="0"/>
+          </a:p>
+          <a:p>
+            <a:pPr lvl="6">
+              <a:buNone/>
+            </a:pPr>
+            <a:endParaRPr lang="en-US" dirty="0"/>
           </a:p>
           <a:p>
             <a:pPr lvl="6">
@@ -45847,7 +47431,7 @@
             </a:pPr>
             <a:r>
               <a:rPr lang="en-US" dirty="0"/>
-              <a:t>(It does not have option, directly plots graph for RGB gains and CCT)</a:t>
+              <a:t>Step4: If you want to plot more graphs then enter 1 else enter 0.</a:t>
             </a:r>
           </a:p>
           <a:p>
@@ -45863,7 +47447,7 @@
           <p:cNvPr id="5" name="Picture 4">
             <a:extLst>
               <a:ext uri="{FF2B5EF4-FFF2-40B4-BE49-F238E27FC236}">
-                <a16:creationId xmlns:a16="http://schemas.microsoft.com/office/drawing/2014/main" id="{DECCA4D6-C945-4D49-866B-0057ECEB125D}"/>
+                <a16:creationId xmlns:a16="http://schemas.microsoft.com/office/drawing/2014/main" id="{42852687-4123-4158-9088-7722BA2C0221}"/>
               </a:ext>
             </a:extLst>
           </p:cNvPr>
@@ -45880,8 +47464,38 @@
         </p:blipFill>
         <p:spPr>
           <a:xfrm>
-            <a:off x="495300" y="3017502"/>
-            <a:ext cx="9334500" cy="1695450"/>
+            <a:off x="688247" y="1644286"/>
+            <a:ext cx="9342882" cy="2590800"/>
+          </a:xfrm>
+          <a:prstGeom prst="rect">
+            <a:avLst/>
+          </a:prstGeom>
+        </p:spPr>
+      </p:pic>
+      <p:pic>
+        <p:nvPicPr>
+          <p:cNvPr id="6" name="Picture 5">
+            <a:extLst>
+              <a:ext uri="{FF2B5EF4-FFF2-40B4-BE49-F238E27FC236}">
+                <a16:creationId xmlns:a16="http://schemas.microsoft.com/office/drawing/2014/main" id="{08C70225-FCCC-4DED-80D1-EB3CCDF759E1}"/>
+              </a:ext>
+            </a:extLst>
+          </p:cNvPr>
+          <p:cNvPicPr>
+            <a:picLocks noChangeAspect="1"/>
+          </p:cNvPicPr>
+          <p:nvPr/>
+        </p:nvPicPr>
+        <p:blipFill>
+          <a:blip r:embed="rId4"/>
+          <a:stretch>
+            <a:fillRect/>
+          </a:stretch>
+        </p:blipFill>
+        <p:spPr>
+          <a:xfrm>
+            <a:off x="688247" y="4593933"/>
+            <a:ext cx="9342882" cy="1882367"/>
           </a:xfrm>
           <a:prstGeom prst="rect">
             <a:avLst/>
@@ -45891,7 +47505,7 @@
     </p:spTree>
     <p:extLst>
       <p:ext uri="{BB962C8B-B14F-4D97-AF65-F5344CB8AC3E}">
-        <p14:creationId xmlns:p14="http://schemas.microsoft.com/office/powerpoint/2010/main" val="1499640917"/>
+        <p14:creationId xmlns:p14="http://schemas.microsoft.com/office/powerpoint/2010/main" val="4139547103"/>
       </p:ext>
     </p:extLst>
   </p:cSld>
@@ -45947,7 +47561,7 @@
           <a:p>
             <a:r>
               <a:rPr lang="en-US" dirty="0"/>
-              <a:t>Note:</a:t>
+              <a:t>Procedure:</a:t>
             </a:r>
           </a:p>
         </p:txBody>
@@ -45964,7 +47578,236 @@
         </p:nvSpPr>
         <p:spPr>
           <a:xfrm>
-            <a:off x="495300" y="1602297"/>
+            <a:off x="495300" y="1149292"/>
+            <a:ext cx="11190732" cy="5217952"/>
+          </a:xfrm>
+        </p:spPr>
+        <p:txBody>
+          <a:bodyPr/>
+          <a:lstStyle/>
+          <a:p>
+            <a:pPr lvl="6">
+              <a:buNone/>
+            </a:pPr>
+            <a:r>
+              <a:rPr lang="en-US" dirty="0"/>
+              <a:t>To run </a:t>
+            </a:r>
+            <a:r>
+              <a:rPr lang="en-US" b="1" dirty="0"/>
+              <a:t>AWB</a:t>
+            </a:r>
+            <a:r>
+              <a:rPr lang="en-US" dirty="0"/>
+              <a:t> log parser, follow below steps</a:t>
+            </a:r>
+          </a:p>
+          <a:p>
+            <a:pPr lvl="6">
+              <a:buNone/>
+            </a:pPr>
+            <a:r>
+              <a:rPr lang="en-US" b="1" dirty="0"/>
+              <a:t>Step1: </a:t>
+            </a:r>
+            <a:r>
+              <a:rPr lang="en-US" dirty="0"/>
+              <a:t>python ParseLog.py &lt;File name or file path&gt;</a:t>
+            </a:r>
+          </a:p>
+          <a:p>
+            <a:pPr lvl="6">
+              <a:buNone/>
+            </a:pPr>
+            <a:r>
+              <a:rPr lang="en-US" dirty="0"/>
+              <a:t>Step2: Enter camera ID (0,1,…, etc. or -1 to show graph for all the available camera ids)</a:t>
+            </a:r>
+          </a:p>
+          <a:p>
+            <a:pPr lvl="6">
+              <a:buNone/>
+            </a:pPr>
+            <a:endParaRPr lang="en-US" dirty="0"/>
+          </a:p>
+          <a:p>
+            <a:pPr lvl="6">
+              <a:buNone/>
+            </a:pPr>
+            <a:endParaRPr lang="en-US" dirty="0"/>
+          </a:p>
+          <a:p>
+            <a:pPr lvl="6">
+              <a:buNone/>
+            </a:pPr>
+            <a:endParaRPr lang="en-US" dirty="0"/>
+          </a:p>
+          <a:p>
+            <a:pPr lvl="6">
+              <a:buNone/>
+            </a:pPr>
+            <a:r>
+              <a:rPr lang="en-US" dirty="0"/>
+              <a:t>Step3: If you want to plot more graphs then enter 1 else enter 0.</a:t>
+            </a:r>
+          </a:p>
+          <a:p>
+            <a:pPr lvl="6">
+              <a:buNone/>
+            </a:pPr>
+            <a:endParaRPr lang="en-US" dirty="0"/>
+          </a:p>
+          <a:p>
+            <a:pPr lvl="6">
+              <a:buNone/>
+            </a:pPr>
+            <a:endParaRPr lang="en-US" dirty="0"/>
+          </a:p>
+          <a:p>
+            <a:pPr lvl="6">
+              <a:buNone/>
+            </a:pPr>
+            <a:endParaRPr lang="en-US" dirty="0"/>
+          </a:p>
+        </p:txBody>
+      </p:sp>
+      <p:pic>
+        <p:nvPicPr>
+          <p:cNvPr id="6" name="Picture 5">
+            <a:extLst>
+              <a:ext uri="{FF2B5EF4-FFF2-40B4-BE49-F238E27FC236}">
+                <a16:creationId xmlns:a16="http://schemas.microsoft.com/office/drawing/2014/main" id="{A238DDD4-7DB6-47EC-879A-14CD42DDCE87}"/>
+              </a:ext>
+            </a:extLst>
+          </p:cNvPr>
+          <p:cNvPicPr>
+            <a:picLocks noChangeAspect="1"/>
+          </p:cNvPicPr>
+          <p:nvPr/>
+        </p:nvPicPr>
+        <p:blipFill>
+          <a:blip r:embed="rId3"/>
+          <a:stretch>
+            <a:fillRect/>
+          </a:stretch>
+        </p:blipFill>
+        <p:spPr>
+          <a:xfrm>
+            <a:off x="505968" y="2518925"/>
+            <a:ext cx="8315325" cy="1591681"/>
+          </a:xfrm>
+          <a:prstGeom prst="rect">
+            <a:avLst/>
+          </a:prstGeom>
+        </p:spPr>
+      </p:pic>
+      <p:pic>
+        <p:nvPicPr>
+          <p:cNvPr id="7" name="Picture 6">
+            <a:extLst>
+              <a:ext uri="{FF2B5EF4-FFF2-40B4-BE49-F238E27FC236}">
+                <a16:creationId xmlns:a16="http://schemas.microsoft.com/office/drawing/2014/main" id="{7BF93EDF-BE58-4280-A346-1B5E3822CEC0}"/>
+              </a:ext>
+            </a:extLst>
+          </p:cNvPr>
+          <p:cNvPicPr>
+            <a:picLocks noChangeAspect="1"/>
+          </p:cNvPicPr>
+          <p:nvPr/>
+        </p:nvPicPr>
+        <p:blipFill>
+          <a:blip r:embed="rId4"/>
+          <a:stretch>
+            <a:fillRect/>
+          </a:stretch>
+        </p:blipFill>
+        <p:spPr>
+          <a:xfrm>
+            <a:off x="505968" y="4513276"/>
+            <a:ext cx="8343900" cy="1853967"/>
+          </a:xfrm>
+          <a:prstGeom prst="rect">
+            <a:avLst/>
+          </a:prstGeom>
+        </p:spPr>
+      </p:pic>
+    </p:spTree>
+    <p:extLst>
+      <p:ext uri="{BB962C8B-B14F-4D97-AF65-F5344CB8AC3E}">
+        <p14:creationId xmlns:p14="http://schemas.microsoft.com/office/powerpoint/2010/main" val="1499640917"/>
+      </p:ext>
+    </p:extLst>
+  </p:cSld>
+  <p:clrMapOvr>
+    <a:masterClrMapping/>
+  </p:clrMapOvr>
+  <mc:AlternateContent xmlns:mc="http://schemas.openxmlformats.org/markup-compatibility/2006" xmlns:p14="http://schemas.microsoft.com/office/powerpoint/2010/main">
+    <mc:Choice Requires="p14">
+      <p:transition spd="med" p14:dur="700">
+        <p:fade/>
+      </p:transition>
+    </mc:Choice>
+    <mc:Fallback xmlns="">
+      <p:transition spd="med">
+        <p:fade/>
+      </p:transition>
+    </mc:Fallback>
+  </mc:AlternateContent>
+</p:sld>
+</file>
+
+<file path=ppt/slides/slide7.xml><?xml version="1.0" encoding="utf-8"?>
+<p:sld xmlns:a="http://schemas.openxmlformats.org/drawingml/2006/main" xmlns:r="http://schemas.openxmlformats.org/officeDocument/2006/relationships" xmlns:p="http://schemas.openxmlformats.org/presentationml/2006/main">
+  <p:cSld>
+    <p:spTree>
+      <p:nvGrpSpPr>
+        <p:cNvPr id="1" name=""/>
+        <p:cNvGrpSpPr/>
+        <p:nvPr/>
+      </p:nvGrpSpPr>
+      <p:grpSpPr>
+        <a:xfrm>
+          <a:off x="0" y="0"/>
+          <a:ext cx="0" cy="0"/>
+          <a:chOff x="0" y="0"/>
+          <a:chExt cx="0" cy="0"/>
+        </a:xfrm>
+      </p:grpSpPr>
+      <p:sp>
+        <p:nvSpPr>
+          <p:cNvPr id="2" name="Title 1"/>
+          <p:cNvSpPr>
+            <a:spLocks noGrp="1"/>
+          </p:cNvSpPr>
+          <p:nvPr>
+            <p:ph type="title"/>
+          </p:nvPr>
+        </p:nvSpPr>
+        <p:spPr/>
+        <p:txBody>
+          <a:bodyPr/>
+          <a:lstStyle/>
+          <a:p>
+            <a:r>
+              <a:rPr lang="en-US" dirty="0"/>
+              <a:t>Note:</a:t>
+            </a:r>
+          </a:p>
+        </p:txBody>
+      </p:sp>
+      <p:sp>
+        <p:nvSpPr>
+          <p:cNvPr id="3" name="Content Placeholder 2"/>
+          <p:cNvSpPr>
+            <a:spLocks noGrp="1"/>
+          </p:cNvSpPr>
+          <p:nvPr>
+            <p:ph idx="12"/>
+          </p:nvPr>
+        </p:nvSpPr>
+        <p:spPr>
+          <a:xfrm>
+            <a:off x="495300" y="1004604"/>
             <a:ext cx="11190732" cy="4764947"/>
           </a:xfrm>
         </p:spPr>
@@ -46046,7 +47889,7 @@
         </p:blipFill>
         <p:spPr>
           <a:xfrm>
-            <a:off x="505968" y="2480354"/>
+            <a:off x="505968" y="1862413"/>
             <a:ext cx="9344025" cy="1512806"/>
           </a:xfrm>
           <a:prstGeom prst="rect">
@@ -46076,7 +47919,7 @@
         </p:blipFill>
         <p:spPr>
           <a:xfrm>
-            <a:off x="495300" y="4590853"/>
+            <a:off x="520255" y="3936512"/>
             <a:ext cx="9315450" cy="1600200"/>
           </a:xfrm>
           <a:prstGeom prst="rect">
@@ -46109,7 +47952,7 @@
 </p:sld>
 </file>
 
-<file path=ppt/slides/slide7.xml><?xml version="1.0" encoding="utf-8"?>
+<file path=ppt/slides/slide8.xml><?xml version="1.0" encoding="utf-8"?>
 <p:sld xmlns:a="http://schemas.openxmlformats.org/drawingml/2006/main" xmlns:r="http://schemas.openxmlformats.org/officeDocument/2006/relationships" xmlns:p="http://schemas.openxmlformats.org/presentationml/2006/main">
   <p:cSld>
     <p:spTree>
@@ -46231,7 +48074,7 @@
 </p:sld>
 </file>
 
-<file path=ppt/slides/slide8.xml><?xml version="1.0" encoding="utf-8"?>
+<file path=ppt/slides/slide9.xml><?xml version="1.0" encoding="utf-8"?>
 <p:sld xmlns:a="http://schemas.openxmlformats.org/drawingml/2006/main" xmlns:r="http://schemas.openxmlformats.org/officeDocument/2006/relationships" xmlns:p="http://schemas.openxmlformats.org/presentationml/2006/main">
   <p:cSld>
     <p:spTree>
@@ -46332,128 +48175,6 @@
     <p:extLst>
       <p:ext uri="{BB962C8B-B14F-4D97-AF65-F5344CB8AC3E}">
         <p14:creationId xmlns:p14="http://schemas.microsoft.com/office/powerpoint/2010/main" val="2595569763"/>
-      </p:ext>
-    </p:extLst>
-  </p:cSld>
-  <p:clrMapOvr>
-    <a:masterClrMapping/>
-  </p:clrMapOvr>
-  <mc:AlternateContent xmlns:mc="http://schemas.openxmlformats.org/markup-compatibility/2006" xmlns:p14="http://schemas.microsoft.com/office/powerpoint/2010/main">
-    <mc:Choice Requires="p14">
-      <p:transition spd="med" p14:dur="700">
-        <p:fade/>
-      </p:transition>
-    </mc:Choice>
-    <mc:Fallback xmlns="">
-      <p:transition spd="med">
-        <p:fade/>
-      </p:transition>
-    </mc:Fallback>
-  </mc:AlternateContent>
-</p:sld>
-</file>
-
-<file path=ppt/slides/slide9.xml><?xml version="1.0" encoding="utf-8"?>
-<p:sld xmlns:a="http://schemas.openxmlformats.org/drawingml/2006/main" xmlns:r="http://schemas.openxmlformats.org/officeDocument/2006/relationships" xmlns:p="http://schemas.openxmlformats.org/presentationml/2006/main">
-  <p:cSld>
-    <p:spTree>
-      <p:nvGrpSpPr>
-        <p:cNvPr id="1" name=""/>
-        <p:cNvGrpSpPr/>
-        <p:nvPr/>
-      </p:nvGrpSpPr>
-      <p:grpSpPr>
-        <a:xfrm>
-          <a:off x="0" y="0"/>
-          <a:ext cx="0" cy="0"/>
-          <a:chOff x="0" y="0"/>
-          <a:chExt cx="0" cy="0"/>
-        </a:xfrm>
-      </p:grpSpPr>
-      <p:sp>
-        <p:nvSpPr>
-          <p:cNvPr id="2" name="Title 1"/>
-          <p:cNvSpPr>
-            <a:spLocks noGrp="1"/>
-          </p:cNvSpPr>
-          <p:nvPr>
-            <p:ph type="title"/>
-          </p:nvPr>
-        </p:nvSpPr>
-        <p:spPr/>
-        <p:txBody>
-          <a:bodyPr/>
-          <a:lstStyle/>
-          <a:p>
-            <a:r>
-              <a:rPr lang="en-US" dirty="0"/>
-              <a:t>Graph:</a:t>
-            </a:r>
-          </a:p>
-        </p:txBody>
-      </p:sp>
-      <p:sp>
-        <p:nvSpPr>
-          <p:cNvPr id="11" name="Subtitle 10">
-            <a:extLst>
-              <a:ext uri="{FF2B5EF4-FFF2-40B4-BE49-F238E27FC236}">
-                <a16:creationId xmlns:a16="http://schemas.microsoft.com/office/drawing/2014/main" id="{8228FD3F-C0A7-455C-928F-5ED86125C266}"/>
-              </a:ext>
-            </a:extLst>
-          </p:cNvPr>
-          <p:cNvSpPr>
-            <a:spLocks noGrp="1"/>
-          </p:cNvSpPr>
-          <p:nvPr>
-            <p:ph type="subTitle" idx="1"/>
-          </p:nvPr>
-        </p:nvSpPr>
-        <p:spPr/>
-        <p:txBody>
-          <a:bodyPr/>
-          <a:lstStyle/>
-          <a:p>
-            <a:r>
-              <a:rPr lang="en-US" dirty="0"/>
-              <a:t>AEC: EV vs Gain &amp; Exposure Time &amp; Sensitivity</a:t>
-            </a:r>
-          </a:p>
-        </p:txBody>
-      </p:sp>
-      <p:pic>
-        <p:nvPicPr>
-          <p:cNvPr id="8" name="Picture 7">
-            <a:extLst>
-              <a:ext uri="{FF2B5EF4-FFF2-40B4-BE49-F238E27FC236}">
-                <a16:creationId xmlns:a16="http://schemas.microsoft.com/office/drawing/2014/main" id="{58FCD94D-CFF5-4D08-B448-7F02C6A0B765}"/>
-              </a:ext>
-            </a:extLst>
-          </p:cNvPr>
-          <p:cNvPicPr>
-            <a:picLocks noChangeAspect="1"/>
-          </p:cNvPicPr>
-          <p:nvPr/>
-        </p:nvPicPr>
-        <p:blipFill>
-          <a:blip r:embed="rId3"/>
-          <a:stretch>
-            <a:fillRect/>
-          </a:stretch>
-        </p:blipFill>
-        <p:spPr>
-          <a:xfrm>
-            <a:off x="125834" y="1505166"/>
-            <a:ext cx="11912367" cy="4986136"/>
-          </a:xfrm>
-          <a:prstGeom prst="rect">
-            <a:avLst/>
-          </a:prstGeom>
-        </p:spPr>
-      </p:pic>
-    </p:spTree>
-    <p:extLst>
-      <p:ext uri="{BB962C8B-B14F-4D97-AF65-F5344CB8AC3E}">
-        <p14:creationId xmlns:p14="http://schemas.microsoft.com/office/powerpoint/2010/main" val="4109322888"/>
       </p:ext>
     </p:extLst>
   </p:cSld>

</xml_diff>